<commit_message>
Filled out Testing Slides
</commit_message>
<xml_diff>
--- a/Delivery Briefing/Delivery Briefing.pptx
+++ b/Delivery Briefing/Delivery Briefing.pptx
@@ -3954,10 +3954,75 @@
           <a:bodyPr/>
           <a:lstStyle/>
           <a:p>
-            <a:endParaRPr lang="en-US"/>
-          </a:p>
-        </p:txBody>
-      </p:sp>
+            <a:r>
+              <a:rPr lang="en-US" dirty="0" smtClean="0"/>
+              <a:t>Functional Testing</a:t>
+            </a:r>
+          </a:p>
+          <a:p>
+            <a:pPr lvl="1"/>
+            <a:r>
+              <a:rPr lang="en-US" dirty="0" smtClean="0"/>
+              <a:t>Manual tests against requirements</a:t>
+            </a:r>
+          </a:p>
+          <a:p>
+            <a:pPr lvl="1"/>
+            <a:r>
+              <a:rPr lang="en-US" dirty="0" smtClean="0"/>
+              <a:t>Extensive use of the debugger</a:t>
+            </a:r>
+          </a:p>
+          <a:p>
+            <a:pPr lvl="1"/>
+            <a:r>
+              <a:rPr lang="en-US" dirty="0" smtClean="0"/>
+              <a:t>Code Reviews</a:t>
+            </a:r>
+            <a:endParaRPr lang="en-US" dirty="0" smtClean="0"/>
+          </a:p>
+          <a:p>
+            <a:pPr lvl="1"/>
+            <a:endParaRPr lang="en-US" dirty="0"/>
+          </a:p>
+          <a:p>
+            <a:pPr marL="585216" lvl="1" indent="0">
+              <a:buNone/>
+            </a:pPr>
+            <a:endParaRPr lang="en-US" dirty="0" smtClean="0"/>
+          </a:p>
+        </p:txBody>
+      </p:sp>
+      <p:pic>
+        <p:nvPicPr>
+          <p:cNvPr id="4" name="Picture 3"/>
+          <p:cNvPicPr>
+            <a:picLocks noChangeAspect="1"/>
+          </p:cNvPicPr>
+          <p:nvPr/>
+        </p:nvPicPr>
+        <p:blipFill>
+          <a:blip r:embed="rId2">
+            <a:extLst>
+              <a:ext uri="{28A0092B-C50C-407E-A947-70E740481C1C}">
+                <a14:useLocalDpi xmlns:a14="http://schemas.microsoft.com/office/drawing/2010/main" val="0"/>
+              </a:ext>
+            </a:extLst>
+          </a:blip>
+          <a:stretch>
+            <a:fillRect/>
+          </a:stretch>
+        </p:blipFill>
+        <p:spPr>
+          <a:xfrm>
+            <a:off x="609600" y="3752045"/>
+            <a:ext cx="7568293" cy="2057400"/>
+          </a:xfrm>
+          <a:prstGeom prst="rect">
+            <a:avLst/>
+          </a:prstGeom>
+        </p:spPr>
+      </p:pic>
     </p:spTree>
     <p:extLst>
       <p:ext uri="{BB962C8B-B14F-4D97-AF65-F5344CB8AC3E}">
@@ -4033,7 +4098,33 @@
           <a:bodyPr/>
           <a:lstStyle/>
           <a:p>
-            <a:endParaRPr lang="en-US"/>
+            <a:r>
+              <a:rPr lang="en-US" dirty="0"/>
+              <a:t>User Interface </a:t>
+            </a:r>
+            <a:r>
+              <a:rPr lang="en-US" dirty="0" smtClean="0"/>
+              <a:t>Testing</a:t>
+            </a:r>
+          </a:p>
+          <a:p>
+            <a:pPr lvl="1"/>
+            <a:r>
+              <a:rPr lang="en-US" dirty="0" smtClean="0"/>
+              <a:t>Comparison with requirements</a:t>
+            </a:r>
+            <a:endParaRPr lang="en-US" dirty="0"/>
+          </a:p>
+          <a:p>
+            <a:pPr lvl="1"/>
+            <a:r>
+              <a:rPr lang="en-US" dirty="0"/>
+              <a:t>Free form </a:t>
+            </a:r>
+            <a:r>
+              <a:rPr lang="en-US" dirty="0" smtClean="0"/>
+              <a:t>testing</a:t>
+            </a:r>
           </a:p>
         </p:txBody>
       </p:sp>
@@ -4112,7 +4203,33 @@
           <a:bodyPr/>
           <a:lstStyle/>
           <a:p>
-            <a:endParaRPr lang="en-US"/>
+            <a:r>
+              <a:rPr lang="en-US" dirty="0"/>
+              <a:t>Performance Testing</a:t>
+            </a:r>
+          </a:p>
+          <a:p>
+            <a:pPr lvl="1"/>
+            <a:r>
+              <a:rPr lang="en-US" dirty="0"/>
+              <a:t>Regular </a:t>
+            </a:r>
+            <a:r>
+              <a:rPr lang="en-US" dirty="0" smtClean="0"/>
+              <a:t>execution of program</a:t>
+            </a:r>
+          </a:p>
+          <a:p>
+            <a:pPr lvl="1"/>
+            <a:r>
+              <a:rPr lang="en-US" dirty="0" smtClean="0"/>
+              <a:t>Evaluation of performance by multiple </a:t>
+            </a:r>
+            <a:r>
+              <a:rPr lang="en-US" smtClean="0"/>
+              <a:t>group members</a:t>
+            </a:r>
+            <a:endParaRPr lang="en-US" dirty="0" smtClean="0"/>
           </a:p>
         </p:txBody>
       </p:sp>
@@ -4191,10 +4308,57 @@
           <a:bodyPr/>
           <a:lstStyle/>
           <a:p>
-            <a:endParaRPr lang="en-US"/>
-          </a:p>
-        </p:txBody>
-      </p:sp>
+            <a:r>
+              <a:rPr lang="en-US" dirty="0" smtClean="0"/>
+              <a:t>Unit Testing</a:t>
+            </a:r>
+          </a:p>
+          <a:p>
+            <a:pPr lvl="1"/>
+            <a:r>
+              <a:rPr lang="en-US" dirty="0" smtClean="0"/>
+              <a:t>Unit testing was performed on the model</a:t>
+            </a:r>
+          </a:p>
+          <a:p>
+            <a:pPr lvl="1"/>
+            <a:r>
+              <a:rPr lang="en-US" dirty="0" smtClean="0"/>
+              <a:t>Difficulties translating to Android tests</a:t>
+            </a:r>
+          </a:p>
+        </p:txBody>
+      </p:sp>
+      <p:pic>
+        <p:nvPicPr>
+          <p:cNvPr id="4" name="Picture 3"/>
+          <p:cNvPicPr>
+            <a:picLocks noChangeAspect="1"/>
+          </p:cNvPicPr>
+          <p:nvPr/>
+        </p:nvPicPr>
+        <p:blipFill>
+          <a:blip r:embed="rId2">
+            <a:extLst>
+              <a:ext uri="{28A0092B-C50C-407E-A947-70E740481C1C}">
+                <a14:useLocalDpi xmlns:a14="http://schemas.microsoft.com/office/drawing/2010/main" val="0"/>
+              </a:ext>
+            </a:extLst>
+          </a:blip>
+          <a:stretch>
+            <a:fillRect/>
+          </a:stretch>
+        </p:blipFill>
+        <p:spPr>
+          <a:xfrm>
+            <a:off x="2057400" y="3412901"/>
+            <a:ext cx="3849109" cy="3429000"/>
+          </a:xfrm>
+          <a:prstGeom prst="rect">
+            <a:avLst/>
+          </a:prstGeom>
+        </p:spPr>
+      </p:pic>
     </p:spTree>
     <p:extLst>
       <p:ext uri="{BB962C8B-B14F-4D97-AF65-F5344CB8AC3E}">
@@ -4392,10 +4556,58 @@
           <a:bodyPr/>
           <a:lstStyle/>
           <a:p>
-            <a:endParaRPr lang="en-US"/>
-          </a:p>
-        </p:txBody>
-      </p:sp>
+            <a:r>
+              <a:rPr lang="en-US" dirty="0" smtClean="0"/>
+              <a:t>Integration Testing</a:t>
+            </a:r>
+          </a:p>
+          <a:p>
+            <a:pPr lvl="1"/>
+            <a:r>
+              <a:rPr lang="en-US" dirty="0" smtClean="0"/>
+              <a:t>Planned on using the Bottom-Up model</a:t>
+            </a:r>
+          </a:p>
+          <a:p>
+            <a:pPr lvl="1"/>
+            <a:r>
+              <a:rPr lang="en-US" dirty="0" smtClean="0"/>
+              <a:t>Did not get to due to difficulties with unit testing in Android and implementation</a:t>
+            </a:r>
+            <a:endParaRPr lang="en-US" dirty="0"/>
+          </a:p>
+        </p:txBody>
+      </p:sp>
+      <p:pic>
+        <p:nvPicPr>
+          <p:cNvPr id="4" name="Picture 3"/>
+          <p:cNvPicPr>
+            <a:picLocks noChangeAspect="1"/>
+          </p:cNvPicPr>
+          <p:nvPr/>
+        </p:nvPicPr>
+        <p:blipFill>
+          <a:blip r:embed="rId2">
+            <a:extLst>
+              <a:ext uri="{28A0092B-C50C-407E-A947-70E740481C1C}">
+                <a14:useLocalDpi xmlns:a14="http://schemas.microsoft.com/office/drawing/2010/main" val="0"/>
+              </a:ext>
+            </a:extLst>
+          </a:blip>
+          <a:stretch>
+            <a:fillRect/>
+          </a:stretch>
+        </p:blipFill>
+        <p:spPr>
+          <a:xfrm>
+            <a:off x="1524000" y="3541320"/>
+            <a:ext cx="6591837" cy="3238810"/>
+          </a:xfrm>
+          <a:prstGeom prst="rect">
+            <a:avLst/>
+          </a:prstGeom>
+        </p:spPr>
+      </p:pic>
     </p:spTree>
     <p:extLst>
       <p:ext uri="{BB962C8B-B14F-4D97-AF65-F5344CB8AC3E}">
@@ -5665,7 +5877,7 @@
         <p:spPr/>
         <p:txBody>
           <a:bodyPr>
-            <a:normAutofit fontScale="77500" lnSpcReduction="20000"/>
+            <a:normAutofit fontScale="70000" lnSpcReduction="20000"/>
           </a:bodyPr>
           <a:lstStyle/>
           <a:p>
@@ -5696,49 +5908,98 @@
             </a:r>
           </a:p>
           <a:p>
-            <a:pPr lvl="0"/>
+            <a:pPr marL="651510" lvl="0" indent="-514350">
+              <a:buFont typeface="+mj-lt"/>
+              <a:buAutoNum type="arabicPeriod"/>
+            </a:pPr>
             <a:r>
               <a:rPr lang="en-US" dirty="0"/>
               <a:t>Player logs into his account </a:t>
             </a:r>
           </a:p>
           <a:p>
-            <a:pPr lvl="0"/>
+            <a:pPr marL="651510" lvl="0" indent="-514350">
+              <a:buFont typeface="+mj-lt"/>
+              <a:buAutoNum type="arabicPeriod"/>
+            </a:pPr>
             <a:r>
               <a:rPr lang="en-US" dirty="0"/>
               <a:t>Player selects preferred options for the game</a:t>
             </a:r>
           </a:p>
           <a:p>
-            <a:pPr lvl="0"/>
+            <a:pPr marL="651510" lvl="0" indent="-514350">
+              <a:buFont typeface="+mj-lt"/>
+              <a:buAutoNum type="arabicPeriod"/>
+            </a:pPr>
             <a:r>
               <a:rPr lang="en-US" dirty="0"/>
               <a:t>System timer starts </a:t>
             </a:r>
           </a:p>
           <a:p>
-            <a:pPr lvl="0"/>
+            <a:pPr marL="651510" lvl="0" indent="-514350">
+              <a:buFont typeface="+mj-lt"/>
+              <a:buAutoNum type="arabicPeriod"/>
+            </a:pPr>
             <a:r>
               <a:rPr lang="en-US" dirty="0"/>
               <a:t>Player is presented with a number of objects based on selected options. </a:t>
             </a:r>
-          </a:p>
-          <a:p>
-            <a:pPr lvl="0"/>
+            <a:endParaRPr lang="en-US" dirty="0" smtClean="0"/>
+          </a:p>
+          <a:p>
+            <a:pPr marL="651510" lvl="0" indent="-514350">
+              <a:buFont typeface="+mj-lt"/>
+              <a:buAutoNum type="arabicPeriod"/>
+            </a:pPr>
+            <a:r>
+              <a:rPr lang="en-US" dirty="0" smtClean="0"/>
+              <a:t>A sequence of objects are activated in sequence by the system.</a:t>
+            </a:r>
+            <a:endParaRPr lang="en-US" dirty="0"/>
+          </a:p>
+          <a:p>
+            <a:pPr marL="651510" lvl="0" indent="-514350">
+              <a:buFont typeface="+mj-lt"/>
+              <a:buAutoNum type="arabicPeriod"/>
+            </a:pPr>
             <a:r>
               <a:rPr lang="en-US" dirty="0"/>
-              <a:t>Objects are activated by the user to mimic the sequence generated by the computer. </a:t>
-            </a:r>
-          </a:p>
-          <a:p>
-            <a:pPr lvl="0"/>
+              <a:t>Objects are activated by the user to mimic the </a:t>
+            </a:r>
+            <a:r>
+              <a:rPr lang="en-US" dirty="0" smtClean="0"/>
+              <a:t>displayed sequence.</a:t>
+            </a:r>
+          </a:p>
+          <a:p>
+            <a:pPr marL="651510" lvl="0" indent="-514350">
+              <a:buFont typeface="+mj-lt"/>
+              <a:buAutoNum type="arabicPeriod"/>
+            </a:pPr>
+            <a:r>
+              <a:rPr lang="en-US" dirty="0" smtClean="0"/>
+              <a:t>If </a:t>
+            </a:r>
             <a:r>
               <a:rPr lang="en-US" dirty="0"/>
-              <a:t>If sequence is successfully duplicated, the player moves to the next round, earns points, and steps 1-3 are repeated</a:t>
-            </a:r>
-          </a:p>
-          <a:p>
-            <a:pPr lvl="0"/>
+              <a:t>sequence is successfully duplicated, the player moves to the next round, earns points, and steps </a:t>
+            </a:r>
+            <a:r>
+              <a:rPr lang="en-US" dirty="0" smtClean="0"/>
+              <a:t>5-6 </a:t>
+            </a:r>
+            <a:r>
+              <a:rPr lang="en-US" dirty="0"/>
+              <a:t>are repeated</a:t>
+            </a:r>
+          </a:p>
+          <a:p>
+            <a:pPr marL="651510" lvl="0" indent="-514350">
+              <a:buFont typeface="+mj-lt"/>
+              <a:buAutoNum type="arabicPeriod"/>
+            </a:pPr>
             <a:r>
               <a:rPr lang="en-US" dirty="0"/>
               <a:t>Else the game ends </a:t>

</xml_diff>

<commit_message>
changed my name to ric
</commit_message>
<xml_diff>
--- a/Delivery Briefing/Delivery Briefing.pptx
+++ b/Delivery Briefing/Delivery Briefing.pptx
@@ -127,7 +127,7 @@
   </p:defaultTextStyle>
   <p:extLst>
     <p:ext uri="{EFAFB233-063F-42B5-8137-9DF3F51BA10A}">
-      <p15:sldGuideLst xmlns:p15="http://schemas.microsoft.com/office/powerpoint/2012/main">
+      <p15:sldGuideLst xmlns:p15="http://schemas.microsoft.com/office/powerpoint/2012/main" xmlns="">
         <p15:guide id="1" orient="horz" pos="2160">
           <p15:clr>
             <a:srgbClr val="A4A3A4"/>
@@ -4738,12 +4738,12 @@
           <a:p>
             <a:pPr lvl="1"/>
             <a:r>
-              <a:rPr lang="en-US" dirty="0" smtClean="0"/>
-              <a:t>Patrick </a:t>
-            </a:r>
-            <a:r>
               <a:rPr lang="en-US" dirty="0" err="1" smtClean="0"/>
-              <a:t>Poirson</a:t>
+              <a:t>Ric</a:t>
+            </a:r>
+            <a:r>
+              <a:rPr lang="en-US" smtClean="0"/>
+              <a:t> Poirson</a:t>
             </a:r>
             <a:endParaRPr lang="en-US" dirty="0"/>
           </a:p>

</xml_diff>